<commit_message>
prezka aktualizacja i tekst do prezki
</commit_message>
<xml_diff>
--- a/Negatyw.pptx
+++ b/Negatyw.pptx
@@ -10,9 +10,11 @@
     <p:sldId id="258" r:id="rId4"/>
     <p:sldId id="259" r:id="rId5"/>
     <p:sldId id="260" r:id="rId6"/>
-    <p:sldId id="261" r:id="rId7"/>
-    <p:sldId id="262" r:id="rId8"/>
-    <p:sldId id="264" r:id="rId9"/>
+    <p:sldId id="266" r:id="rId7"/>
+    <p:sldId id="265" r:id="rId8"/>
+    <p:sldId id="262" r:id="rId9"/>
+    <p:sldId id="267" r:id="rId10"/>
+    <p:sldId id="264" r:id="rId11"/>
   </p:sldIdLst>
   <p:sldSz cx="12192000" cy="6858000"/>
   <p:notesSz cx="6858000" cy="9144000"/>
@@ -372,7 +374,7 @@
           <c:smooth val="0"/>
           <c:extLst>
             <c:ext xmlns:c16="http://schemas.microsoft.com/office/drawing/2014/chart" uri="{C3380CC4-5D6E-409C-BE32-E72D297353CC}">
-              <c16:uniqueId val="{00000000-BED4-411A-8A77-BE9CF14FC28C}"/>
+              <c16:uniqueId val="{00000000-789B-4F92-8FD1-BACBB587CB2C}"/>
             </c:ext>
           </c:extLst>
         </c:ser>
@@ -481,67 +483,67 @@
                 <c:formatCode>General</c:formatCode>
                 <c:ptCount val="21"/>
                 <c:pt idx="0">
-                  <c:v>38392</c:v>
+                  <c:v>35117</c:v>
                 </c:pt>
                 <c:pt idx="1">
-                  <c:v>12982</c:v>
+                  <c:v>14335</c:v>
                 </c:pt>
                 <c:pt idx="2">
-                  <c:v>27047</c:v>
+                  <c:v>14547</c:v>
                 </c:pt>
                 <c:pt idx="3">
-                  <c:v>30818</c:v>
+                  <c:v>18137</c:v>
                 </c:pt>
                 <c:pt idx="4">
-                  <c:v>33147</c:v>
+                  <c:v>19347</c:v>
                 </c:pt>
                 <c:pt idx="5">
-                  <c:v>33844</c:v>
+                  <c:v>19450</c:v>
                 </c:pt>
                 <c:pt idx="6">
-                  <c:v>50730</c:v>
+                  <c:v>22395</c:v>
                 </c:pt>
                 <c:pt idx="7">
-                  <c:v>36547</c:v>
+                  <c:v>24202</c:v>
                 </c:pt>
                 <c:pt idx="8">
-                  <c:v>31061</c:v>
+                  <c:v>27073</c:v>
                 </c:pt>
                 <c:pt idx="9">
-                  <c:v>48964</c:v>
+                  <c:v>28747</c:v>
                 </c:pt>
                 <c:pt idx="10">
-                  <c:v>50611</c:v>
+                  <c:v>36909</c:v>
                 </c:pt>
                 <c:pt idx="11">
                   <c:v>49433</c:v>
                 </c:pt>
                 <c:pt idx="12">
-                  <c:v>97350</c:v>
+                  <c:v>53653</c:v>
                 </c:pt>
                 <c:pt idx="13">
-                  <c:v>99748</c:v>
+                  <c:v>63780</c:v>
                 </c:pt>
                 <c:pt idx="14">
-                  <c:v>135168</c:v>
+                  <c:v>76407</c:v>
                 </c:pt>
                 <c:pt idx="15">
-                  <c:v>148489</c:v>
+                  <c:v>88054</c:v>
                 </c:pt>
                 <c:pt idx="16">
-                  <c:v>272300</c:v>
+                  <c:v>103168</c:v>
                 </c:pt>
                 <c:pt idx="17">
-                  <c:v>279472</c:v>
+                  <c:v>114277</c:v>
                 </c:pt>
                 <c:pt idx="18">
-                  <c:v>369525</c:v>
+                  <c:v>116295</c:v>
                 </c:pt>
                 <c:pt idx="19">
-                  <c:v>391747</c:v>
+                  <c:v>130257</c:v>
                 </c:pt>
                 <c:pt idx="20">
-                  <c:v>534487</c:v>
+                  <c:v>154375</c:v>
                 </c:pt>
               </c:numCache>
             </c:numRef>
@@ -549,7 +551,7 @@
           <c:smooth val="0"/>
           <c:extLst>
             <c:ext xmlns:c16="http://schemas.microsoft.com/office/drawing/2014/chart" uri="{C3380CC4-5D6E-409C-BE32-E72D297353CC}">
-              <c16:uniqueId val="{00000001-BED4-411A-8A77-BE9CF14FC28C}"/>
+              <c16:uniqueId val="{00000001-789B-4F92-8FD1-BACBB587CB2C}"/>
             </c:ext>
           </c:extLst>
         </c:ser>
@@ -686,8 +688,8 @@
         <c:manualLayout>
           <c:xMode val="edge"/>
           <c:yMode val="edge"/>
-          <c:x val="0.28499270924467773"/>
-          <c:y val="0.9092257217847769"/>
+          <c:x val="0.41261731161236614"/>
+          <c:y val="0.93045840139233249"/>
           <c:w val="0.21888907115777195"/>
           <c:h val="6.6964754405699295E-2"/>
         </c:manualLayout>
@@ -1481,7 +1483,7 @@
           <a:p>
             <a:fld id="{48A87A34-81AB-432B-8DAE-1953F412C126}" type="datetimeFigureOut">
               <a:rPr lang="en-US" dirty="0"/>
-              <a:t>11/29/2019</a:t>
+              <a:t>11/30/2019</a:t>
             </a:fld>
             <a:endParaRPr lang="en-US" dirty="0"/>
           </a:p>
@@ -1743,7 +1745,7 @@
           <a:p>
             <a:fld id="{48A87A34-81AB-432B-8DAE-1953F412C126}" type="datetimeFigureOut">
               <a:rPr lang="en-US" dirty="0"/>
-              <a:t>11/29/2019</a:t>
+              <a:t>11/30/2019</a:t>
             </a:fld>
             <a:endParaRPr lang="en-US" dirty="0"/>
           </a:p>
@@ -1970,7 +1972,7 @@
             <a:fld id="{48A87A34-81AB-432B-8DAE-1953F412C126}" type="datetimeFigureOut">
               <a:rPr lang="en-US" dirty="0"/>
               <a:pPr/>
-              <a:t>11/29/2019</a:t>
+              <a:t>11/30/2019</a:t>
             </a:fld>
             <a:endParaRPr lang="en-US" dirty="0"/>
           </a:p>
@@ -2276,7 +2278,7 @@
             <a:fld id="{48A87A34-81AB-432B-8DAE-1953F412C126}" type="datetimeFigureOut">
               <a:rPr lang="en-US" dirty="0"/>
               <a:pPr/>
-              <a:t>11/29/2019</a:t>
+              <a:t>11/30/2019</a:t>
             </a:fld>
             <a:endParaRPr lang="en-US" dirty="0"/>
           </a:p>
@@ -2745,7 +2747,7 @@
             <a:fld id="{48A87A34-81AB-432B-8DAE-1953F412C126}" type="datetimeFigureOut">
               <a:rPr lang="en-US" dirty="0"/>
               <a:pPr/>
-              <a:t>11/29/2019</a:t>
+              <a:t>11/30/2019</a:t>
             </a:fld>
             <a:endParaRPr lang="en-US" dirty="0"/>
           </a:p>
@@ -3287,7 +3289,7 @@
           <a:p>
             <a:fld id="{48A87A34-81AB-432B-8DAE-1953F412C126}" type="datetimeFigureOut">
               <a:rPr lang="en-US" dirty="0"/>
-              <a:t>11/29/2019</a:t>
+              <a:t>11/30/2019</a:t>
             </a:fld>
             <a:endParaRPr lang="en-US" dirty="0"/>
           </a:p>
@@ -4056,7 +4058,7 @@
           <a:p>
             <a:fld id="{48A87A34-81AB-432B-8DAE-1953F412C126}" type="datetimeFigureOut">
               <a:rPr lang="en-US" dirty="0"/>
-              <a:t>11/29/2019</a:t>
+              <a:t>11/30/2019</a:t>
             </a:fld>
             <a:endParaRPr lang="en-US" dirty="0"/>
           </a:p>
@@ -4226,7 +4228,7 @@
           <a:p>
             <a:fld id="{48A87A34-81AB-432B-8DAE-1953F412C126}" type="datetimeFigureOut">
               <a:rPr lang="en-US" dirty="0"/>
-              <a:t>11/29/2019</a:t>
+              <a:t>11/30/2019</a:t>
             </a:fld>
             <a:endParaRPr lang="en-US" dirty="0"/>
           </a:p>
@@ -4445,7 +4447,7 @@
             <a:fld id="{48A87A34-81AB-432B-8DAE-1953F412C126}" type="datetimeFigureOut">
               <a:rPr lang="en-US" dirty="0"/>
               <a:pPr/>
-              <a:t>11/29/2019</a:t>
+              <a:t>11/30/2019</a:t>
             </a:fld>
             <a:endParaRPr lang="en-US" dirty="0"/>
           </a:p>
@@ -4620,7 +4622,7 @@
           <a:p>
             <a:fld id="{48A87A34-81AB-432B-8DAE-1953F412C126}" type="datetimeFigureOut">
               <a:rPr lang="en-US" dirty="0"/>
-              <a:t>11/29/2019</a:t>
+              <a:t>11/30/2019</a:t>
             </a:fld>
             <a:endParaRPr lang="en-US" dirty="0"/>
           </a:p>
@@ -4905,7 +4907,7 @@
             <a:fld id="{48A87A34-81AB-432B-8DAE-1953F412C126}" type="datetimeFigureOut">
               <a:rPr lang="en-US" dirty="0"/>
               <a:pPr/>
-              <a:t>11/29/2019</a:t>
+              <a:t>11/30/2019</a:t>
             </a:fld>
             <a:endParaRPr lang="en-US" dirty="0"/>
           </a:p>
@@ -5142,7 +5144,7 @@
           <a:p>
             <a:fld id="{48A87A34-81AB-432B-8DAE-1953F412C126}" type="datetimeFigureOut">
               <a:rPr lang="en-US" dirty="0"/>
-              <a:t>11/29/2019</a:t>
+              <a:t>11/30/2019</a:t>
             </a:fld>
             <a:endParaRPr lang="en-US" dirty="0"/>
           </a:p>
@@ -5516,7 +5518,7 @@
           <a:p>
             <a:fld id="{48A87A34-81AB-432B-8DAE-1953F412C126}" type="datetimeFigureOut">
               <a:rPr lang="en-US" dirty="0"/>
-              <a:t>11/29/2019</a:t>
+              <a:t>11/30/2019</a:t>
             </a:fld>
             <a:endParaRPr lang="en-US" dirty="0"/>
           </a:p>
@@ -5629,7 +5631,7 @@
           <a:p>
             <a:fld id="{48A87A34-81AB-432B-8DAE-1953F412C126}" type="datetimeFigureOut">
               <a:rPr lang="en-US" dirty="0"/>
-              <a:t>11/29/2019</a:t>
+              <a:t>11/30/2019</a:t>
             </a:fld>
             <a:endParaRPr lang="en-US" dirty="0"/>
           </a:p>
@@ -5719,7 +5721,7 @@
           <a:p>
             <a:fld id="{48A87A34-81AB-432B-8DAE-1953F412C126}" type="datetimeFigureOut">
               <a:rPr lang="en-US" dirty="0"/>
-              <a:t>11/29/2019</a:t>
+              <a:t>11/30/2019</a:t>
             </a:fld>
             <a:endParaRPr lang="en-US" dirty="0"/>
           </a:p>
@@ -5963,7 +5965,7 @@
           <a:p>
             <a:fld id="{48A87A34-81AB-432B-8DAE-1953F412C126}" type="datetimeFigureOut">
               <a:rPr lang="en-US" dirty="0"/>
-              <a:t>11/29/2019</a:t>
+              <a:t>11/30/2019</a:t>
             </a:fld>
             <a:endParaRPr lang="en-US" dirty="0"/>
           </a:p>
@@ -6215,7 +6217,7 @@
           <a:p>
             <a:fld id="{48A87A34-81AB-432B-8DAE-1953F412C126}" type="datetimeFigureOut">
               <a:rPr lang="en-US" dirty="0"/>
-              <a:t>11/29/2019</a:t>
+              <a:t>11/30/2019</a:t>
             </a:fld>
             <a:endParaRPr lang="en-US" dirty="0"/>
           </a:p>
@@ -6454,7 +6456,7 @@
             <a:fld id="{48A87A34-81AB-432B-8DAE-1953F412C126}" type="datetimeFigureOut">
               <a:rPr lang="en-US" dirty="0"/>
               <a:pPr/>
-              <a:t>11/29/2019</a:t>
+              <a:t>11/30/2019</a:t>
             </a:fld>
             <a:endParaRPr lang="en-US" dirty="0"/>
           </a:p>
@@ -7124,6 +7126,387 @@
 </p:sld>
 </file>
 
+<file path=ppt/slides/slide10.xml><?xml version="1.0" encoding="utf-8"?>
+<p:sld xmlns:a="http://schemas.openxmlformats.org/drawingml/2006/main" xmlns:r="http://schemas.openxmlformats.org/officeDocument/2006/relationships" xmlns:p="http://schemas.openxmlformats.org/presentationml/2006/main">
+  <p:cSld>
+    <p:bg>
+      <p:bgPr>
+        <a:solidFill>
+          <a:schemeClr val="bg1"/>
+        </a:solidFill>
+        <a:effectLst/>
+      </p:bgPr>
+    </p:bg>
+    <p:spTree>
+      <p:nvGrpSpPr>
+        <p:cNvPr id="1" name=""/>
+        <p:cNvGrpSpPr/>
+        <p:nvPr/>
+      </p:nvGrpSpPr>
+      <p:grpSpPr>
+        <a:xfrm>
+          <a:off x="0" y="0"/>
+          <a:ext cx="0" cy="0"/>
+          <a:chOff x="0" y="0"/>
+          <a:chExt cx="0" cy="0"/>
+        </a:xfrm>
+      </p:grpSpPr>
+      <p:pic>
+        <p:nvPicPr>
+          <p:cNvPr id="10" name="Picture 9">
+            <a:extLst>
+              <a:ext uri="{FF2B5EF4-FFF2-40B4-BE49-F238E27FC236}">
+                <a16:creationId xmlns:a16="http://schemas.microsoft.com/office/drawing/2014/main" id="{75577CC7-6B96-4908-84E4-0D2AC01834E3}"/>
+              </a:ext>
+              <a:ext uri="{C183D7F6-B498-43B3-948B-1728B52AA6E4}">
+                <adec:decorative xmlns:adec="http://schemas.microsoft.com/office/drawing/2017/decorative" val="1"/>
+              </a:ext>
+            </a:extLst>
+          </p:cNvPr>
+          <p:cNvPicPr>
+            <a:picLocks noGrp="1" noRot="1" noChangeAspect="1" noMove="1" noResize="1" noEditPoints="1" noAdjustHandles="1" noChangeArrowheads="1" noChangeShapeType="1" noCrop="1"/>
+          </p:cNvPicPr>
+          <p:nvPr>
+            <p:extLst>
+              <p:ext uri="{386F3935-93C4-4BCD-93E2-E3B085C9AB24}">
+                <p16:designElem xmlns:p16="http://schemas.microsoft.com/office/powerpoint/2015/main" val="1"/>
+              </p:ext>
+            </p:extLst>
+          </p:nvPr>
+        </p:nvPicPr>
+        <p:blipFill>
+          <a:blip r:embed="rId2">
+            <a:extLst>
+              <a:ext uri="{28A0092B-C50C-407E-A947-70E740481C1C}">
+                <a14:useLocalDpi xmlns:a14="http://schemas.microsoft.com/office/drawing/2010/main" val="0"/>
+              </a:ext>
+            </a:extLst>
+          </a:blip>
+          <a:stretch>
+            <a:fillRect/>
+          </a:stretch>
+        </p:blipFill>
+        <p:spPr>
+          <a:xfrm>
+            <a:off x="0" y="0"/>
+            <a:ext cx="12192000" cy="1441450"/>
+          </a:xfrm>
+          <a:prstGeom prst="rect">
+            <a:avLst/>
+          </a:prstGeom>
+        </p:spPr>
+      </p:pic>
+      <p:pic>
+        <p:nvPicPr>
+          <p:cNvPr id="12" name="Picture 11">
+            <a:extLst>
+              <a:ext uri="{FF2B5EF4-FFF2-40B4-BE49-F238E27FC236}">
+                <a16:creationId xmlns:a16="http://schemas.microsoft.com/office/drawing/2014/main" id="{3094519A-B61A-4BE2-9E40-30E744081BB3}"/>
+              </a:ext>
+              <a:ext uri="{C183D7F6-B498-43B3-948B-1728B52AA6E4}">
+                <adec:decorative xmlns:adec="http://schemas.microsoft.com/office/drawing/2017/decorative" val="1"/>
+              </a:ext>
+            </a:extLst>
+          </p:cNvPr>
+          <p:cNvPicPr>
+            <a:picLocks noGrp="1" noRot="1" noChangeAspect="1" noMove="1" noResize="1" noEditPoints="1" noAdjustHandles="1" noChangeArrowheads="1" noChangeShapeType="1" noCrop="1"/>
+          </p:cNvPicPr>
+          <p:nvPr>
+            <p:extLst>
+              <p:ext uri="{386F3935-93C4-4BCD-93E2-E3B085C9AB24}">
+                <p16:designElem xmlns:p16="http://schemas.microsoft.com/office/powerpoint/2015/main" val="1"/>
+              </p:ext>
+            </p:extLst>
+          </p:nvPr>
+        </p:nvPicPr>
+        <p:blipFill>
+          <a:blip r:embed="rId3">
+            <a:extLst>
+              <a:ext uri="{28A0092B-C50C-407E-A947-70E740481C1C}">
+                <a14:useLocalDpi xmlns:a14="http://schemas.microsoft.com/office/drawing/2010/main" val="0"/>
+              </a:ext>
+            </a:extLst>
+          </a:blip>
+          <a:stretch>
+            <a:fillRect/>
+          </a:stretch>
+        </p:blipFill>
+        <p:spPr>
+          <a:xfrm>
+            <a:off x="0" y="4375150"/>
+            <a:ext cx="12192000" cy="2482850"/>
+          </a:xfrm>
+          <a:prstGeom prst="rect">
+            <a:avLst/>
+          </a:prstGeom>
+        </p:spPr>
+      </p:pic>
+      <p:sp useBgFill="1">
+        <p:nvSpPr>
+          <p:cNvPr id="14" name="Rectangle 13">
+            <a:extLst>
+              <a:ext uri="{FF2B5EF4-FFF2-40B4-BE49-F238E27FC236}">
+                <a16:creationId xmlns:a16="http://schemas.microsoft.com/office/drawing/2014/main" id="{A7244538-290E-40DA-A93A-14BB3E6CF173}"/>
+              </a:ext>
+              <a:ext uri="{C183D7F6-B498-43B3-948B-1728B52AA6E4}">
+                <adec:decorative xmlns:adec="http://schemas.microsoft.com/office/drawing/2017/decorative" val="1"/>
+              </a:ext>
+            </a:extLst>
+          </p:cNvPr>
+          <p:cNvSpPr>
+            <a:spLocks noGrp="1" noRot="1" noChangeAspect="1" noMove="1" noResize="1" noEditPoints="1" noAdjustHandles="1" noChangeArrowheads="1" noChangeShapeType="1" noTextEdit="1"/>
+          </p:cNvSpPr>
+          <p:nvPr>
+            <p:extLst>
+              <p:ext uri="{386F3935-93C4-4BCD-93E2-E3B085C9AB24}">
+                <p16:designElem xmlns:p16="http://schemas.microsoft.com/office/powerpoint/2015/main" val="1"/>
+              </p:ext>
+            </p:extLst>
+          </p:nvPr>
+        </p:nvSpPr>
+        <p:spPr>
+          <a:xfrm>
+            <a:off x="0" y="-2"/>
+            <a:ext cx="12191999" cy="4543721"/>
+          </a:xfrm>
+          <a:prstGeom prst="rect">
+            <a:avLst/>
+          </a:prstGeom>
+          <a:ln>
+            <a:noFill/>
+          </a:ln>
+        </p:spPr>
+        <p:style>
+          <a:lnRef idx="2">
+            <a:schemeClr val="accent1">
+              <a:shade val="50000"/>
+            </a:schemeClr>
+          </a:lnRef>
+          <a:fillRef idx="1">
+            <a:schemeClr val="accent1"/>
+          </a:fillRef>
+          <a:effectRef idx="0">
+            <a:schemeClr val="accent1"/>
+          </a:effectRef>
+          <a:fontRef idx="minor">
+            <a:schemeClr val="lt1"/>
+          </a:fontRef>
+        </p:style>
+        <p:txBody>
+          <a:bodyPr rtlCol="0" anchor="ctr"/>
+          <a:lstStyle/>
+          <a:p>
+            <a:pPr algn="ctr"/>
+            <a:endParaRPr lang="en-US"/>
+          </a:p>
+        </p:txBody>
+      </p:sp>
+      <p:sp>
+        <p:nvSpPr>
+          <p:cNvPr id="2" name="Tytuł 1">
+            <a:extLst>
+              <a:ext uri="{FF2B5EF4-FFF2-40B4-BE49-F238E27FC236}">
+                <a16:creationId xmlns:a16="http://schemas.microsoft.com/office/drawing/2014/main" id="{B5682A94-F3AF-43E5-87DA-79425C23963B}"/>
+              </a:ext>
+            </a:extLst>
+          </p:cNvPr>
+          <p:cNvSpPr>
+            <a:spLocks noGrp="1"/>
+          </p:cNvSpPr>
+          <p:nvPr>
+            <p:ph type="title"/>
+          </p:nvPr>
+        </p:nvSpPr>
+        <p:spPr>
+          <a:xfrm>
+            <a:off x="5615888" y="673240"/>
+            <a:ext cx="5951914" cy="3446373"/>
+          </a:xfrm>
+          <a:noFill/>
+          <a:ln w="19050">
+            <a:noFill/>
+            <a:prstDash val="dash"/>
+          </a:ln>
+        </p:spPr>
+        <p:txBody>
+          <a:bodyPr vert="horz" lIns="91440" tIns="45720" rIns="91440" bIns="45720" rtlCol="0" anchor="b">
+            <a:normAutofit/>
+          </a:bodyPr>
+          <a:lstStyle/>
+          <a:p>
+            <a:pPr algn="r"/>
+            <a:r>
+              <a:rPr lang="en-US" sz="4800"/>
+              <a:t>Dziękuję za uwagę</a:t>
+            </a:r>
+          </a:p>
+        </p:txBody>
+      </p:sp>
+      <p:sp useBgFill="1">
+        <p:nvSpPr>
+          <p:cNvPr id="16" name="Rectangle 15">
+            <a:extLst>
+              <a:ext uri="{FF2B5EF4-FFF2-40B4-BE49-F238E27FC236}">
+                <a16:creationId xmlns:a16="http://schemas.microsoft.com/office/drawing/2014/main" id="{AB1DF3B3-9DBC-445D-AE4E-A62E5A9B85D5}"/>
+              </a:ext>
+              <a:ext uri="{C183D7F6-B498-43B3-948B-1728B52AA6E4}">
+                <adec:decorative xmlns:adec="http://schemas.microsoft.com/office/drawing/2017/decorative" val="1"/>
+              </a:ext>
+            </a:extLst>
+          </p:cNvPr>
+          <p:cNvSpPr>
+            <a:spLocks noGrp="1" noRot="1" noChangeAspect="1" noMove="1" noResize="1" noEditPoints="1" noAdjustHandles="1" noChangeArrowheads="1" noChangeShapeType="1" noTextEdit="1"/>
+          </p:cNvSpPr>
+          <p:nvPr>
+            <p:extLst>
+              <p:ext uri="{386F3935-93C4-4BCD-93E2-E3B085C9AB24}">
+                <p16:designElem xmlns:p16="http://schemas.microsoft.com/office/powerpoint/2015/main" val="1"/>
+              </p:ext>
+            </p:extLst>
+          </p:nvPr>
+        </p:nvSpPr>
+        <p:spPr>
+          <a:xfrm>
+            <a:off x="-1" y="0"/>
+            <a:ext cx="4966386" cy="6858000"/>
+          </a:xfrm>
+          <a:prstGeom prst="rect">
+            <a:avLst/>
+          </a:prstGeom>
+          <a:ln>
+            <a:noFill/>
+          </a:ln>
+        </p:spPr>
+        <p:style>
+          <a:lnRef idx="2">
+            <a:schemeClr val="accent1">
+              <a:shade val="50000"/>
+            </a:schemeClr>
+          </a:lnRef>
+          <a:fillRef idx="1">
+            <a:schemeClr val="accent1"/>
+          </a:fillRef>
+          <a:effectRef idx="0">
+            <a:schemeClr val="accent1"/>
+          </a:effectRef>
+          <a:fontRef idx="minor">
+            <a:schemeClr val="lt1"/>
+          </a:fontRef>
+        </p:style>
+        <p:txBody>
+          <a:bodyPr rtlCol="0" anchor="ctr"/>
+          <a:lstStyle/>
+          <a:p>
+            <a:pPr algn="ctr"/>
+            <a:endParaRPr lang="en-US"/>
+          </a:p>
+        </p:txBody>
+      </p:sp>
+      <p:pic>
+        <p:nvPicPr>
+          <p:cNvPr id="5" name="Obraz 4">
+            <a:extLst>
+              <a:ext uri="{FF2B5EF4-FFF2-40B4-BE49-F238E27FC236}">
+                <a16:creationId xmlns:a16="http://schemas.microsoft.com/office/drawing/2014/main" id="{5833AE4D-2043-4730-A29F-2C1452879143}"/>
+              </a:ext>
+            </a:extLst>
+          </p:cNvPr>
+          <p:cNvPicPr>
+            <a:picLocks noChangeAspect="1"/>
+          </p:cNvPicPr>
+          <p:nvPr/>
+        </p:nvPicPr>
+        <p:blipFill rotWithShape="1">
+          <a:blip r:embed="rId4"/>
+          <a:srcRect l="5406" r="7585"/>
+          <a:stretch/>
+        </p:blipFill>
+        <p:spPr>
+          <a:xfrm>
+            <a:off x="-4" y="10"/>
+            <a:ext cx="4654291" cy="6857990"/>
+          </a:xfrm>
+          <a:prstGeom prst="rect">
+            <a:avLst/>
+          </a:prstGeom>
+        </p:spPr>
+      </p:pic>
+      <p:sp>
+        <p:nvSpPr>
+          <p:cNvPr id="18" name="Rectangle 17">
+            <a:extLst>
+              <a:ext uri="{FF2B5EF4-FFF2-40B4-BE49-F238E27FC236}">
+                <a16:creationId xmlns:a16="http://schemas.microsoft.com/office/drawing/2014/main" id="{F51F80E8-0CAC-410E-B59A-29FDDC357ED4}"/>
+              </a:ext>
+              <a:ext uri="{C183D7F6-B498-43B3-948B-1728B52AA6E4}">
+                <adec:decorative xmlns:adec="http://schemas.microsoft.com/office/drawing/2017/decorative" val="1"/>
+              </a:ext>
+            </a:extLst>
+          </p:cNvPr>
+          <p:cNvSpPr>
+            <a:spLocks noGrp="1" noRot="1" noChangeAspect="1" noMove="1" noResize="1" noEditPoints="1" noAdjustHandles="1" noChangeArrowheads="1" noChangeShapeType="1" noTextEdit="1"/>
+          </p:cNvSpPr>
+          <p:nvPr>
+            <p:extLst>
+              <p:ext uri="{386F3935-93C4-4BCD-93E2-E3B085C9AB24}">
+                <p16:designElem xmlns:p16="http://schemas.microsoft.com/office/powerpoint/2015/main" val="1"/>
+              </p:ext>
+            </p:extLst>
+          </p:nvPr>
+        </p:nvSpPr>
+        <p:spPr>
+          <a:xfrm>
+            <a:off x="7946782" y="-1"/>
+            <a:ext cx="4245218" cy="536715"/>
+          </a:xfrm>
+          <a:prstGeom prst="rect">
+            <a:avLst/>
+          </a:prstGeom>
+          <a:solidFill>
+            <a:schemeClr val="bg1"/>
+          </a:solidFill>
+          <a:ln>
+            <a:noFill/>
+          </a:ln>
+        </p:spPr>
+        <p:style>
+          <a:lnRef idx="2">
+            <a:schemeClr val="accent1">
+              <a:shade val="50000"/>
+            </a:schemeClr>
+          </a:lnRef>
+          <a:fillRef idx="1">
+            <a:schemeClr val="accent1"/>
+          </a:fillRef>
+          <a:effectRef idx="0">
+            <a:schemeClr val="accent1"/>
+          </a:effectRef>
+          <a:fontRef idx="minor">
+            <a:schemeClr val="lt1"/>
+          </a:fontRef>
+        </p:style>
+        <p:txBody>
+          <a:bodyPr rtlCol="0" anchor="ctr"/>
+          <a:lstStyle/>
+          <a:p>
+            <a:pPr algn="ctr"/>
+            <a:endParaRPr lang="en-US"/>
+          </a:p>
+        </p:txBody>
+      </p:sp>
+    </p:spTree>
+    <p:extLst>
+      <p:ext uri="{BB962C8B-B14F-4D97-AF65-F5344CB8AC3E}">
+        <p14:creationId xmlns:p14="http://schemas.microsoft.com/office/powerpoint/2010/main" val="485248565"/>
+      </p:ext>
+    </p:extLst>
+  </p:cSld>
+  <p:clrMapOvr>
+    <a:masterClrMapping/>
+  </p:clrMapOvr>
+</p:sld>
+</file>
+
 <file path=ppt/slides/slide2.xml><?xml version="1.0" encoding="utf-8"?>
 <p:sld xmlns:a="http://schemas.openxmlformats.org/drawingml/2006/main" xmlns:r="http://schemas.openxmlformats.org/officeDocument/2006/relationships" xmlns:p="http://schemas.openxmlformats.org/presentationml/2006/main">
   <p:cSld>
@@ -7460,7 +7843,7 @@
         </p:blipFill>
         <p:spPr>
           <a:xfrm>
-            <a:off x="6460464" y="2311272"/>
+            <a:off x="6522610" y="2178107"/>
             <a:ext cx="5467350" cy="3228975"/>
           </a:xfrm>
           <a:prstGeom prst="rect">
@@ -7504,7 +7887,7 @@
         </p:blipFill>
         <p:spPr>
           <a:xfrm>
-            <a:off x="164337" y="2311272"/>
+            <a:off x="202040" y="2178107"/>
             <a:ext cx="5479943" cy="3228975"/>
           </a:xfrm>
           <a:prstGeom prst="rect">
@@ -7531,8 +7914,8 @@
         </p:nvSpPr>
         <p:spPr>
           <a:xfrm>
-            <a:off x="5731536" y="3429000"/>
-            <a:ext cx="728928" cy="840769"/>
+            <a:off x="5762611" y="3522020"/>
+            <a:ext cx="728927" cy="541148"/>
           </a:xfrm>
           <a:prstGeom prst="rightArrow">
             <a:avLst/>
@@ -7559,7 +7942,7 @@
           <a:lstStyle/>
           <a:p>
             <a:pPr algn="ctr"/>
-            <a:endParaRPr lang="pl-PL"/>
+            <a:endParaRPr lang="pl-PL" dirty="0"/>
           </a:p>
         </p:txBody>
       </p:sp>
@@ -7809,7 +8192,7 @@
           <p:cNvPr id="2" name="Tytuł 1">
             <a:extLst>
               <a:ext uri="{FF2B5EF4-FFF2-40B4-BE49-F238E27FC236}">
-                <a16:creationId xmlns:a16="http://schemas.microsoft.com/office/drawing/2014/main" id="{4B39055F-2298-40D8-8919-08C27C8A150F}"/>
+                <a16:creationId xmlns:a16="http://schemas.microsoft.com/office/drawing/2014/main" id="{820EF4B0-F143-4E5F-B4B6-34497EB8BEED}"/>
               </a:ext>
             </a:extLst>
           </p:cNvPr>
@@ -7822,7 +8205,7 @@
         </p:nvSpPr>
         <p:spPr>
           <a:xfrm>
-            <a:off x="2975499" y="366880"/>
+            <a:off x="3037643" y="267223"/>
             <a:ext cx="8610600" cy="1293028"/>
           </a:xfrm>
         </p:spPr>
@@ -7842,7 +8225,7 @@
           <p:cNvPr id="4" name="Symbol zastępczy zawartości 3">
             <a:extLst>
               <a:ext uri="{FF2B5EF4-FFF2-40B4-BE49-F238E27FC236}">
-                <a16:creationId xmlns:a16="http://schemas.microsoft.com/office/drawing/2014/main" id="{72D8179B-D0FC-4DA0-BD49-4694A90F77CC}"/>
+                <a16:creationId xmlns:a16="http://schemas.microsoft.com/office/drawing/2014/main" id="{8C9601C2-D73E-4297-83A7-5364D065F8FF}"/>
               </a:ext>
             </a:extLst>
           </p:cNvPr>
@@ -7853,14 +8236,14 @@
             <p:ph idx="1"/>
             <p:extLst>
               <p:ext uri="{D42A27DB-BD31-4B8C-83A1-F6EECF244321}">
-                <p14:modId xmlns:p14="http://schemas.microsoft.com/office/powerpoint/2010/main" val="4033334584"/>
+                <p14:modId xmlns:p14="http://schemas.microsoft.com/office/powerpoint/2010/main" val="2276059726"/>
               </p:ext>
             </p:extLst>
           </p:nvPr>
         </p:nvGraphicFramePr>
         <p:xfrm>
-          <a:off x="570391" y="1793290"/>
-          <a:ext cx="5037418" cy="4051316"/>
+          <a:off x="1004656" y="1455938"/>
+          <a:ext cx="3435658" cy="5051909"/>
         </p:xfrm>
         <a:graphic>
           <a:graphicData uri="http://schemas.openxmlformats.org/drawingml/2006/table">
@@ -7869,29 +8252,29 @@
                 <a:tableStyleId>{5C22544A-7EE6-4342-B048-85BDC9FD1C3A}</a:tableStyleId>
               </a:tblPr>
               <a:tblGrid>
-                <a:gridCol w="1678769">
+                <a:gridCol w="1144966">
                   <a:extLst>
                     <a:ext uri="{9D8B030D-6E8A-4147-A177-3AD203B41FA5}">
-                      <a16:colId xmlns:a16="http://schemas.microsoft.com/office/drawing/2014/main" val="3778399658"/>
+                      <a16:colId xmlns:a16="http://schemas.microsoft.com/office/drawing/2014/main" val="1226109487"/>
                     </a:ext>
                   </a:extLst>
                 </a:gridCol>
-                <a:gridCol w="1601940">
+                <a:gridCol w="1145346">
                   <a:extLst>
                     <a:ext uri="{9D8B030D-6E8A-4147-A177-3AD203B41FA5}">
-                      <a16:colId xmlns:a16="http://schemas.microsoft.com/office/drawing/2014/main" val="1747181766"/>
+                      <a16:colId xmlns:a16="http://schemas.microsoft.com/office/drawing/2014/main" val="3674934424"/>
                     </a:ext>
                   </a:extLst>
                 </a:gridCol>
-                <a:gridCol w="1756709">
+                <a:gridCol w="1145346">
                   <a:extLst>
                     <a:ext uri="{9D8B030D-6E8A-4147-A177-3AD203B41FA5}">
-                      <a16:colId xmlns:a16="http://schemas.microsoft.com/office/drawing/2014/main" val="3135205181"/>
+                      <a16:colId xmlns:a16="http://schemas.microsoft.com/office/drawing/2014/main" val="3533831349"/>
                     </a:ext>
                   </a:extLst>
                 </a:gridCol>
               </a:tblGrid>
-              <a:tr h="184019">
+              <a:tr h="229469">
                 <a:tc>
                   <a:txBody>
                     <a:bodyPr/>
@@ -7906,12 +8289,12 @@
                         </a:spcAft>
                       </a:pPr>
                       <a:r>
-                        <a:rPr lang="pl-PL" sz="1100">
+                        <a:rPr lang="pl-PL" sz="1100" dirty="0">
                           <a:effectLst/>
                         </a:rPr>
                         <a:t>Ilość wątków</a:t>
                       </a:r>
-                      <a:endParaRPr lang="pl-PL" sz="1100">
+                      <a:endParaRPr lang="pl-PL" sz="1100" dirty="0">
                         <a:effectLst/>
                         <a:latin typeface="Calibri" panose="020F0502020204030204" pitchFamily="34" charset="0"/>
                         <a:ea typeface="Calibri" panose="020F0502020204030204" pitchFamily="34" charset="0"/>
@@ -7964,12 +8347,12 @@
                         </a:spcAft>
                       </a:pPr>
                       <a:r>
-                        <a:rPr lang="pl-PL" sz="1100" dirty="0">
+                        <a:rPr lang="pl-PL" sz="1100">
                           <a:effectLst/>
                         </a:rPr>
                         <a:t>ASM</a:t>
                       </a:r>
-                      <a:endParaRPr lang="pl-PL" sz="1100" dirty="0">
+                      <a:endParaRPr lang="pl-PL" sz="1100">
                         <a:effectLst/>
                         <a:latin typeface="Calibri" panose="020F0502020204030204" pitchFamily="34" charset="0"/>
                         <a:ea typeface="Calibri" panose="020F0502020204030204" pitchFamily="34" charset="0"/>
@@ -7981,11 +8364,11 @@
                 </a:tc>
                 <a:extLst>
                   <a:ext uri="{0D108BD9-81ED-4DB2-BD59-A6C34878D82A}">
-                    <a16:rowId xmlns:a16="http://schemas.microsoft.com/office/drawing/2014/main" val="1317676610"/>
+                    <a16:rowId xmlns:a16="http://schemas.microsoft.com/office/drawing/2014/main" val="2192667677"/>
                   </a:ext>
                 </a:extLst>
               </a:tr>
-              <a:tr h="184157">
+              <a:tr h="229640">
                 <a:tc>
                   <a:txBody>
                     <a:bodyPr/>
@@ -8000,12 +8383,12 @@
                         </a:spcAft>
                       </a:pPr>
                       <a:r>
-                        <a:rPr lang="pl-PL" sz="1100">
+                        <a:rPr lang="pl-PL" sz="1100" dirty="0">
                           <a:effectLst/>
                         </a:rPr>
                         <a:t>1</a:t>
                       </a:r>
-                      <a:endParaRPr lang="pl-PL" sz="1100">
+                      <a:endParaRPr lang="pl-PL" sz="1100" dirty="0">
                         <a:effectLst/>
                         <a:latin typeface="Calibri" panose="020F0502020204030204" pitchFamily="34" charset="0"/>
                         <a:ea typeface="Calibri" panose="020F0502020204030204" pitchFamily="34" charset="0"/>
@@ -8061,7 +8444,7 @@
                         <a:rPr lang="pl-PL" sz="1100">
                           <a:effectLst/>
                         </a:rPr>
-                        <a:t>38392</a:t>
+                        <a:t>35117</a:t>
                       </a:r>
                       <a:endParaRPr lang="pl-PL" sz="1100">
                         <a:effectLst/>
@@ -8075,11 +8458,11 @@
                 </a:tc>
                 <a:extLst>
                   <a:ext uri="{0D108BD9-81ED-4DB2-BD59-A6C34878D82A}">
-                    <a16:rowId xmlns:a16="http://schemas.microsoft.com/office/drawing/2014/main" val="885450358"/>
+                    <a16:rowId xmlns:a16="http://schemas.microsoft.com/office/drawing/2014/main" val="437063564"/>
                   </a:ext>
                 </a:extLst>
               </a:tr>
-              <a:tr h="184157">
+              <a:tr h="229640">
                 <a:tc>
                   <a:txBody>
                     <a:bodyPr/>
@@ -8155,7 +8538,7 @@
                         <a:rPr lang="pl-PL" sz="1100">
                           <a:effectLst/>
                         </a:rPr>
-                        <a:t>12982</a:t>
+                        <a:t>14335</a:t>
                       </a:r>
                       <a:endParaRPr lang="pl-PL" sz="1100">
                         <a:effectLst/>
@@ -8169,11 +8552,11 @@
                 </a:tc>
                 <a:extLst>
                   <a:ext uri="{0D108BD9-81ED-4DB2-BD59-A6C34878D82A}">
-                    <a16:rowId xmlns:a16="http://schemas.microsoft.com/office/drawing/2014/main" val="230264202"/>
+                    <a16:rowId xmlns:a16="http://schemas.microsoft.com/office/drawing/2014/main" val="2927628178"/>
                   </a:ext>
                 </a:extLst>
               </a:tr>
-              <a:tr h="184157">
+              <a:tr h="229640">
                 <a:tc>
                   <a:txBody>
                     <a:bodyPr/>
@@ -8246,12 +8629,12 @@
                         </a:spcAft>
                       </a:pPr>
                       <a:r>
-                        <a:rPr lang="pl-PL" sz="1100" dirty="0">
+                        <a:rPr lang="pl-PL" sz="1100">
                           <a:effectLst/>
                         </a:rPr>
-                        <a:t>27047</a:t>
+                        <a:t>14547</a:t>
                       </a:r>
-                      <a:endParaRPr lang="pl-PL" sz="1100" dirty="0">
+                      <a:endParaRPr lang="pl-PL" sz="1100">
                         <a:effectLst/>
                         <a:latin typeface="Calibri" panose="020F0502020204030204" pitchFamily="34" charset="0"/>
                         <a:ea typeface="Calibri" panose="020F0502020204030204" pitchFamily="34" charset="0"/>
@@ -8263,11 +8646,11 @@
                 </a:tc>
                 <a:extLst>
                   <a:ext uri="{0D108BD9-81ED-4DB2-BD59-A6C34878D82A}">
-                    <a16:rowId xmlns:a16="http://schemas.microsoft.com/office/drawing/2014/main" val="1005478200"/>
+                    <a16:rowId xmlns:a16="http://schemas.microsoft.com/office/drawing/2014/main" val="2448233783"/>
                   </a:ext>
                 </a:extLst>
               </a:tr>
-              <a:tr h="184157">
+              <a:tr h="229640">
                 <a:tc>
                   <a:txBody>
                     <a:bodyPr/>
@@ -8343,7 +8726,7 @@
                         <a:rPr lang="pl-PL" sz="1100">
                           <a:effectLst/>
                         </a:rPr>
-                        <a:t>30818</a:t>
+                        <a:t>18137</a:t>
                       </a:r>
                       <a:endParaRPr lang="pl-PL" sz="1100">
                         <a:effectLst/>
@@ -8357,11 +8740,11 @@
                 </a:tc>
                 <a:extLst>
                   <a:ext uri="{0D108BD9-81ED-4DB2-BD59-A6C34878D82A}">
-                    <a16:rowId xmlns:a16="http://schemas.microsoft.com/office/drawing/2014/main" val="2655607207"/>
+                    <a16:rowId xmlns:a16="http://schemas.microsoft.com/office/drawing/2014/main" val="1981271234"/>
                   </a:ext>
                 </a:extLst>
               </a:tr>
-              <a:tr h="184157">
+              <a:tr h="229640">
                 <a:tc>
                   <a:txBody>
                     <a:bodyPr/>
@@ -8437,7 +8820,7 @@
                         <a:rPr lang="pl-PL" sz="1100">
                           <a:effectLst/>
                         </a:rPr>
-                        <a:t>33147</a:t>
+                        <a:t>19347</a:t>
                       </a:r>
                       <a:endParaRPr lang="pl-PL" sz="1100">
                         <a:effectLst/>
@@ -8451,11 +8834,11 @@
                 </a:tc>
                 <a:extLst>
                   <a:ext uri="{0D108BD9-81ED-4DB2-BD59-A6C34878D82A}">
-                    <a16:rowId xmlns:a16="http://schemas.microsoft.com/office/drawing/2014/main" val="3574511639"/>
+                    <a16:rowId xmlns:a16="http://schemas.microsoft.com/office/drawing/2014/main" val="3003505405"/>
                   </a:ext>
                 </a:extLst>
               </a:tr>
-              <a:tr h="184157">
+              <a:tr h="229640">
                 <a:tc>
                   <a:txBody>
                     <a:bodyPr/>
@@ -8470,12 +8853,12 @@
                         </a:spcAft>
                       </a:pPr>
                       <a:r>
-                        <a:rPr lang="pl-PL" sz="1100">
+                        <a:rPr lang="pl-PL" sz="1100" dirty="0">
                           <a:effectLst/>
                         </a:rPr>
                         <a:t>6</a:t>
                       </a:r>
-                      <a:endParaRPr lang="pl-PL" sz="1100">
+                      <a:endParaRPr lang="pl-PL" sz="1100" dirty="0">
                         <a:effectLst/>
                         <a:latin typeface="Calibri" panose="020F0502020204030204" pitchFamily="34" charset="0"/>
                         <a:ea typeface="Calibri" panose="020F0502020204030204" pitchFamily="34" charset="0"/>
@@ -8531,7 +8914,7 @@
                         <a:rPr lang="pl-PL" sz="1100">
                           <a:effectLst/>
                         </a:rPr>
-                        <a:t>33844</a:t>
+                        <a:t>19450</a:t>
                       </a:r>
                       <a:endParaRPr lang="pl-PL" sz="1100">
                         <a:effectLst/>
@@ -8545,11 +8928,11 @@
                 </a:tc>
                 <a:extLst>
                   <a:ext uri="{0D108BD9-81ED-4DB2-BD59-A6C34878D82A}">
-                    <a16:rowId xmlns:a16="http://schemas.microsoft.com/office/drawing/2014/main" val="3947652702"/>
+                    <a16:rowId xmlns:a16="http://schemas.microsoft.com/office/drawing/2014/main" val="3157937572"/>
                   </a:ext>
                 </a:extLst>
               </a:tr>
-              <a:tr h="184157">
+              <a:tr h="229640">
                 <a:tc>
                   <a:txBody>
                     <a:bodyPr/>
@@ -8625,7 +9008,7 @@
                         <a:rPr lang="pl-PL" sz="1100">
                           <a:effectLst/>
                         </a:rPr>
-                        <a:t>50730</a:t>
+                        <a:t>22395</a:t>
                       </a:r>
                       <a:endParaRPr lang="pl-PL" sz="1100">
                         <a:effectLst/>
@@ -8639,11 +9022,11 @@
                 </a:tc>
                 <a:extLst>
                   <a:ext uri="{0D108BD9-81ED-4DB2-BD59-A6C34878D82A}">
-                    <a16:rowId xmlns:a16="http://schemas.microsoft.com/office/drawing/2014/main" val="65565372"/>
+                    <a16:rowId xmlns:a16="http://schemas.microsoft.com/office/drawing/2014/main" val="1027292306"/>
                   </a:ext>
                 </a:extLst>
               </a:tr>
-              <a:tr h="184157">
+              <a:tr h="229640">
                 <a:tc>
                   <a:txBody>
                     <a:bodyPr/>
@@ -8716,12 +9099,12 @@
                         </a:spcAft>
                       </a:pPr>
                       <a:r>
-                        <a:rPr lang="pl-PL" sz="1100">
+                        <a:rPr lang="pl-PL" sz="1100" dirty="0">
                           <a:effectLst/>
                         </a:rPr>
-                        <a:t>36547</a:t>
+                        <a:t>24202</a:t>
                       </a:r>
-                      <a:endParaRPr lang="pl-PL" sz="1100">
+                      <a:endParaRPr lang="pl-PL" sz="1100" dirty="0">
                         <a:effectLst/>
                         <a:latin typeface="Calibri" panose="020F0502020204030204" pitchFamily="34" charset="0"/>
                         <a:ea typeface="Calibri" panose="020F0502020204030204" pitchFamily="34" charset="0"/>
@@ -8733,11 +9116,11 @@
                 </a:tc>
                 <a:extLst>
                   <a:ext uri="{0D108BD9-81ED-4DB2-BD59-A6C34878D82A}">
-                    <a16:rowId xmlns:a16="http://schemas.microsoft.com/office/drawing/2014/main" val="3020496091"/>
+                    <a16:rowId xmlns:a16="http://schemas.microsoft.com/office/drawing/2014/main" val="3291792761"/>
                   </a:ext>
                 </a:extLst>
               </a:tr>
-              <a:tr h="184157">
+              <a:tr h="229640">
                 <a:tc>
                   <a:txBody>
                     <a:bodyPr/>
@@ -8813,7 +9196,7 @@
                         <a:rPr lang="pl-PL" sz="1100">
                           <a:effectLst/>
                         </a:rPr>
-                        <a:t>31061</a:t>
+                        <a:t>27073</a:t>
                       </a:r>
                       <a:endParaRPr lang="pl-PL" sz="1100">
                         <a:effectLst/>
@@ -8827,11 +9210,11 @@
                 </a:tc>
                 <a:extLst>
                   <a:ext uri="{0D108BD9-81ED-4DB2-BD59-A6C34878D82A}">
-                    <a16:rowId xmlns:a16="http://schemas.microsoft.com/office/drawing/2014/main" val="607436383"/>
+                    <a16:rowId xmlns:a16="http://schemas.microsoft.com/office/drawing/2014/main" val="3195064540"/>
                   </a:ext>
                 </a:extLst>
               </a:tr>
-              <a:tr h="184157">
+              <a:tr h="229640">
                 <a:tc>
                   <a:txBody>
                     <a:bodyPr/>
@@ -8907,7 +9290,7 @@
                         <a:rPr lang="pl-PL" sz="1100">
                           <a:effectLst/>
                         </a:rPr>
-                        <a:t>48964</a:t>
+                        <a:t>28747</a:t>
                       </a:r>
                       <a:endParaRPr lang="pl-PL" sz="1100">
                         <a:effectLst/>
@@ -8921,11 +9304,11 @@
                 </a:tc>
                 <a:extLst>
                   <a:ext uri="{0D108BD9-81ED-4DB2-BD59-A6C34878D82A}">
-                    <a16:rowId xmlns:a16="http://schemas.microsoft.com/office/drawing/2014/main" val="336017597"/>
+                    <a16:rowId xmlns:a16="http://schemas.microsoft.com/office/drawing/2014/main" val="2872207641"/>
                   </a:ext>
                 </a:extLst>
               </a:tr>
-              <a:tr h="184157">
+              <a:tr h="229640">
                 <a:tc>
                   <a:txBody>
                     <a:bodyPr/>
@@ -9001,7 +9384,7 @@
                         <a:rPr lang="pl-PL" sz="1100">
                           <a:effectLst/>
                         </a:rPr>
-                        <a:t>50611</a:t>
+                        <a:t>36909</a:t>
                       </a:r>
                       <a:endParaRPr lang="pl-PL" sz="1100">
                         <a:effectLst/>
@@ -9015,11 +9398,11 @@
                 </a:tc>
                 <a:extLst>
                   <a:ext uri="{0D108BD9-81ED-4DB2-BD59-A6C34878D82A}">
-                    <a16:rowId xmlns:a16="http://schemas.microsoft.com/office/drawing/2014/main" val="2110314205"/>
+                    <a16:rowId xmlns:a16="http://schemas.microsoft.com/office/drawing/2014/main" val="888778284"/>
                   </a:ext>
                 </a:extLst>
               </a:tr>
-              <a:tr h="184157">
+              <a:tr h="229640">
                 <a:tc>
                   <a:txBody>
                     <a:bodyPr/>
@@ -9109,11 +9492,11 @@
                 </a:tc>
                 <a:extLst>
                   <a:ext uri="{0D108BD9-81ED-4DB2-BD59-A6C34878D82A}">
-                    <a16:rowId xmlns:a16="http://schemas.microsoft.com/office/drawing/2014/main" val="440831309"/>
+                    <a16:rowId xmlns:a16="http://schemas.microsoft.com/office/drawing/2014/main" val="2529872916"/>
                   </a:ext>
                 </a:extLst>
               </a:tr>
-              <a:tr h="184157">
+              <a:tr h="229640">
                 <a:tc>
                   <a:txBody>
                     <a:bodyPr/>
@@ -9189,7 +9572,7 @@
                         <a:rPr lang="pl-PL" sz="1100">
                           <a:effectLst/>
                         </a:rPr>
-                        <a:t>97350</a:t>
+                        <a:t>53653</a:t>
                       </a:r>
                       <a:endParaRPr lang="pl-PL" sz="1100">
                         <a:effectLst/>
@@ -9203,11 +9586,11 @@
                 </a:tc>
                 <a:extLst>
                   <a:ext uri="{0D108BD9-81ED-4DB2-BD59-A6C34878D82A}">
-                    <a16:rowId xmlns:a16="http://schemas.microsoft.com/office/drawing/2014/main" val="3440401624"/>
+                    <a16:rowId xmlns:a16="http://schemas.microsoft.com/office/drawing/2014/main" val="1563407101"/>
                   </a:ext>
                 </a:extLst>
               </a:tr>
-              <a:tr h="184157">
+              <a:tr h="229640">
                 <a:tc>
                   <a:txBody>
                     <a:bodyPr/>
@@ -9283,7 +9666,7 @@
                         <a:rPr lang="pl-PL" sz="1100">
                           <a:effectLst/>
                         </a:rPr>
-                        <a:t>99748</a:t>
+                        <a:t>63780</a:t>
                       </a:r>
                       <a:endParaRPr lang="pl-PL" sz="1100">
                         <a:effectLst/>
@@ -9297,11 +9680,11 @@
                 </a:tc>
                 <a:extLst>
                   <a:ext uri="{0D108BD9-81ED-4DB2-BD59-A6C34878D82A}">
-                    <a16:rowId xmlns:a16="http://schemas.microsoft.com/office/drawing/2014/main" val="664579987"/>
+                    <a16:rowId xmlns:a16="http://schemas.microsoft.com/office/drawing/2014/main" val="1011529581"/>
                   </a:ext>
                 </a:extLst>
               </a:tr>
-              <a:tr h="184157">
+              <a:tr h="229640">
                 <a:tc>
                   <a:txBody>
                     <a:bodyPr/>
@@ -9377,7 +9760,7 @@
                         <a:rPr lang="pl-PL" sz="1100">
                           <a:effectLst/>
                         </a:rPr>
-                        <a:t>135168</a:t>
+                        <a:t>76407</a:t>
                       </a:r>
                       <a:endParaRPr lang="pl-PL" sz="1100">
                         <a:effectLst/>
@@ -9391,11 +9774,11 @@
                 </a:tc>
                 <a:extLst>
                   <a:ext uri="{0D108BD9-81ED-4DB2-BD59-A6C34878D82A}">
-                    <a16:rowId xmlns:a16="http://schemas.microsoft.com/office/drawing/2014/main" val="466243273"/>
+                    <a16:rowId xmlns:a16="http://schemas.microsoft.com/office/drawing/2014/main" val="1013724269"/>
                   </a:ext>
                 </a:extLst>
               </a:tr>
-              <a:tr h="184157">
+              <a:tr h="229640">
                 <a:tc>
                   <a:txBody>
                     <a:bodyPr/>
@@ -9471,7 +9854,7 @@
                         <a:rPr lang="pl-PL" sz="1100">
                           <a:effectLst/>
                         </a:rPr>
-                        <a:t>148489</a:t>
+                        <a:t>88054</a:t>
                       </a:r>
                       <a:endParaRPr lang="pl-PL" sz="1100">
                         <a:effectLst/>
@@ -9485,11 +9868,11 @@
                 </a:tc>
                 <a:extLst>
                   <a:ext uri="{0D108BD9-81ED-4DB2-BD59-A6C34878D82A}">
-                    <a16:rowId xmlns:a16="http://schemas.microsoft.com/office/drawing/2014/main" val="364794393"/>
+                    <a16:rowId xmlns:a16="http://schemas.microsoft.com/office/drawing/2014/main" val="1211219126"/>
                   </a:ext>
                 </a:extLst>
               </a:tr>
-              <a:tr h="184157">
+              <a:tr h="229640">
                 <a:tc>
                   <a:txBody>
                     <a:bodyPr/>
@@ -9565,7 +9948,7 @@
                         <a:rPr lang="pl-PL" sz="1100">
                           <a:effectLst/>
                         </a:rPr>
-                        <a:t>272300</a:t>
+                        <a:t>103168</a:t>
                       </a:r>
                       <a:endParaRPr lang="pl-PL" sz="1100">
                         <a:effectLst/>
@@ -9579,11 +9962,11 @@
                 </a:tc>
                 <a:extLst>
                   <a:ext uri="{0D108BD9-81ED-4DB2-BD59-A6C34878D82A}">
-                    <a16:rowId xmlns:a16="http://schemas.microsoft.com/office/drawing/2014/main" val="293611180"/>
+                    <a16:rowId xmlns:a16="http://schemas.microsoft.com/office/drawing/2014/main" val="3051725044"/>
                   </a:ext>
                 </a:extLst>
               </a:tr>
-              <a:tr h="184157">
+              <a:tr h="229640">
                 <a:tc>
                   <a:txBody>
                     <a:bodyPr/>
@@ -9659,7 +10042,7 @@
                         <a:rPr lang="pl-PL" sz="1100">
                           <a:effectLst/>
                         </a:rPr>
-                        <a:t>279472</a:t>
+                        <a:t>114277</a:t>
                       </a:r>
                       <a:endParaRPr lang="pl-PL" sz="1100">
                         <a:effectLst/>
@@ -9673,11 +10056,11 @@
                 </a:tc>
                 <a:extLst>
                   <a:ext uri="{0D108BD9-81ED-4DB2-BD59-A6C34878D82A}">
-                    <a16:rowId xmlns:a16="http://schemas.microsoft.com/office/drawing/2014/main" val="2738662698"/>
+                    <a16:rowId xmlns:a16="http://schemas.microsoft.com/office/drawing/2014/main" val="1784657089"/>
                   </a:ext>
                 </a:extLst>
               </a:tr>
-              <a:tr h="184157">
+              <a:tr h="229640">
                 <a:tc>
                   <a:txBody>
                     <a:bodyPr/>
@@ -9753,7 +10136,7 @@
                         <a:rPr lang="pl-PL" sz="1100">
                           <a:effectLst/>
                         </a:rPr>
-                        <a:t>369525</a:t>
+                        <a:t>116295</a:t>
                       </a:r>
                       <a:endParaRPr lang="pl-PL" sz="1100">
                         <a:effectLst/>
@@ -9767,11 +10150,11 @@
                 </a:tc>
                 <a:extLst>
                   <a:ext uri="{0D108BD9-81ED-4DB2-BD59-A6C34878D82A}">
-                    <a16:rowId xmlns:a16="http://schemas.microsoft.com/office/drawing/2014/main" val="1643703640"/>
+                    <a16:rowId xmlns:a16="http://schemas.microsoft.com/office/drawing/2014/main" val="237488032"/>
                   </a:ext>
                 </a:extLst>
               </a:tr>
-              <a:tr h="184157">
+              <a:tr h="229640">
                 <a:tc>
                   <a:txBody>
                     <a:bodyPr/>
@@ -9847,7 +10230,7 @@
                         <a:rPr lang="pl-PL" sz="1100">
                           <a:effectLst/>
                         </a:rPr>
-                        <a:t>391747</a:t>
+                        <a:t>130257</a:t>
                       </a:r>
                       <a:endParaRPr lang="pl-PL" sz="1100">
                         <a:effectLst/>
@@ -9861,11 +10244,11 @@
                 </a:tc>
                 <a:extLst>
                   <a:ext uri="{0D108BD9-81ED-4DB2-BD59-A6C34878D82A}">
-                    <a16:rowId xmlns:a16="http://schemas.microsoft.com/office/drawing/2014/main" val="4226005569"/>
+                    <a16:rowId xmlns:a16="http://schemas.microsoft.com/office/drawing/2014/main" val="1907085558"/>
                   </a:ext>
                 </a:extLst>
               </a:tr>
-              <a:tr h="184157">
+              <a:tr h="229640">
                 <a:tc>
                   <a:txBody>
                     <a:bodyPr/>
@@ -9941,7 +10324,7 @@
                         <a:rPr lang="pl-PL" sz="1100" dirty="0">
                           <a:effectLst/>
                         </a:rPr>
-                        <a:t>534487</a:t>
+                        <a:t>154375</a:t>
                       </a:r>
                       <a:endParaRPr lang="pl-PL" sz="1100" dirty="0">
                         <a:effectLst/>
@@ -9955,7 +10338,7 @@
                 </a:tc>
                 <a:extLst>
                   <a:ext uri="{0D108BD9-81ED-4DB2-BD59-A6C34878D82A}">
-                    <a16:rowId xmlns:a16="http://schemas.microsoft.com/office/drawing/2014/main" val="583136229"/>
+                    <a16:rowId xmlns:a16="http://schemas.microsoft.com/office/drawing/2014/main" val="3634225770"/>
                   </a:ext>
                 </a:extLst>
               </a:tr>
@@ -9963,38 +10346,111 @@
           </a:graphicData>
         </a:graphic>
       </p:graphicFrame>
-      <p:graphicFrame>
-        <p:nvGraphicFramePr>
-          <p:cNvPr id="5" name="Wykres 4">
+      <p:sp>
+        <p:nvSpPr>
+          <p:cNvPr id="6" name="pole tekstowe 5">
             <a:extLst>
               <a:ext uri="{FF2B5EF4-FFF2-40B4-BE49-F238E27FC236}">
-                <a16:creationId xmlns:a16="http://schemas.microsoft.com/office/drawing/2014/main" id="{694A139B-0AA6-4597-BCC7-75A152019ADA}"/>
+                <a16:creationId xmlns:a16="http://schemas.microsoft.com/office/drawing/2014/main" id="{7445B40D-5F38-4A7D-B390-535B18BEDFA3}"/>
               </a:ext>
             </a:extLst>
           </p:cNvPr>
-          <p:cNvGraphicFramePr/>
-          <p:nvPr>
-            <p:extLst>
-              <p:ext uri="{D42A27DB-BD31-4B8C-83A1-F6EECF244321}">
-                <p14:modId xmlns:p14="http://schemas.microsoft.com/office/powerpoint/2010/main" val="261204495"/>
-              </p:ext>
-            </p:extLst>
-          </p:nvPr>
-        </p:nvGraphicFramePr>
-        <p:xfrm>
-          <a:off x="5850384" y="1793290"/>
-          <a:ext cx="5771225" cy="4172504"/>
-        </p:xfrm>
-        <a:graphic>
-          <a:graphicData uri="http://schemas.openxmlformats.org/drawingml/2006/chart">
-            <c:chart xmlns:c="http://schemas.openxmlformats.org/drawingml/2006/chart" xmlns:r="http://schemas.openxmlformats.org/officeDocument/2006/relationships" r:id="rId2"/>
-          </a:graphicData>
-        </a:graphic>
-      </p:graphicFrame>
+          <p:cNvSpPr txBox="1"/>
+          <p:nvPr/>
+        </p:nvSpPr>
+        <p:spPr>
+          <a:xfrm>
+            <a:off x="5541148" y="2095131"/>
+            <a:ext cx="4421080" cy="646331"/>
+          </a:xfrm>
+          <a:prstGeom prst="rect">
+            <a:avLst/>
+          </a:prstGeom>
+          <a:noFill/>
+        </p:spPr>
+        <p:txBody>
+          <a:bodyPr wrap="square" rtlCol="0">
+            <a:spAutoFit/>
+          </a:bodyPr>
+          <a:lstStyle/>
+          <a:p>
+            <a:r>
+              <a:rPr lang="pl-PL" dirty="0"/>
+              <a:t>Pomiar czasu za pomocą biblioteki &lt;</a:t>
+            </a:r>
+            <a:r>
+              <a:rPr lang="pl-PL" dirty="0" err="1"/>
+              <a:t>chrono.h</a:t>
+            </a:r>
+            <a:r>
+              <a:rPr lang="pl-PL" dirty="0"/>
+              <a:t>&gt;</a:t>
+            </a:r>
+          </a:p>
+        </p:txBody>
+      </p:sp>
+      <p:pic>
+        <p:nvPicPr>
+          <p:cNvPr id="7" name="Obraz 6">
+            <a:extLst>
+              <a:ext uri="{FF2B5EF4-FFF2-40B4-BE49-F238E27FC236}">
+                <a16:creationId xmlns:a16="http://schemas.microsoft.com/office/drawing/2014/main" id="{8154E16D-2DEA-4540-968B-B9FD40E38B5B}"/>
+              </a:ext>
+            </a:extLst>
+          </p:cNvPr>
+          <p:cNvPicPr>
+            <a:picLocks noChangeAspect="1"/>
+          </p:cNvPicPr>
+          <p:nvPr/>
+        </p:nvPicPr>
+        <p:blipFill rotWithShape="1">
+          <a:blip r:embed="rId2"/>
+          <a:srcRect l="1404" t="91024" r="14345"/>
+          <a:stretch/>
+        </p:blipFill>
+        <p:spPr>
+          <a:xfrm>
+            <a:off x="4930533" y="3637975"/>
+            <a:ext cx="6587010" cy="687833"/>
+          </a:xfrm>
+          <a:prstGeom prst="rect">
+            <a:avLst/>
+          </a:prstGeom>
+        </p:spPr>
+      </p:pic>
+      <p:pic>
+        <p:nvPicPr>
+          <p:cNvPr id="8" name="Obraz 7">
+            <a:extLst>
+              <a:ext uri="{FF2B5EF4-FFF2-40B4-BE49-F238E27FC236}">
+                <a16:creationId xmlns:a16="http://schemas.microsoft.com/office/drawing/2014/main" id="{2F068AF0-F8C4-485C-8FF3-152372C6179A}"/>
+              </a:ext>
+            </a:extLst>
+          </p:cNvPr>
+          <p:cNvPicPr>
+            <a:picLocks noChangeAspect="1"/>
+          </p:cNvPicPr>
+          <p:nvPr/>
+        </p:nvPicPr>
+        <p:blipFill rotWithShape="1">
+          <a:blip r:embed="rId3"/>
+          <a:srcRect t="20295" b="28700"/>
+          <a:stretch/>
+        </p:blipFill>
+        <p:spPr>
+          <a:xfrm>
+            <a:off x="4911668" y="3199700"/>
+            <a:ext cx="6913387" cy="241639"/>
+          </a:xfrm>
+          <a:prstGeom prst="rect">
+            <a:avLst/>
+          </a:prstGeom>
+        </p:spPr>
+      </p:pic>
     </p:spTree>
     <p:extLst>
       <p:ext uri="{BB962C8B-B14F-4D97-AF65-F5344CB8AC3E}">
-        <p14:creationId xmlns:p14="http://schemas.microsoft.com/office/powerpoint/2010/main" val="3231414873"/>
+        <p14:creationId xmlns:p14="http://schemas.microsoft.com/office/powerpoint/2010/main" val="2917581516"/>
       </p:ext>
     </p:extLst>
   </p:cSld>
@@ -10026,7 +10482,7 @@
           <p:cNvPr id="2" name="Tytuł 1">
             <a:extLst>
               <a:ext uri="{FF2B5EF4-FFF2-40B4-BE49-F238E27FC236}">
-                <a16:creationId xmlns:a16="http://schemas.microsoft.com/office/drawing/2014/main" id="{15F5E021-45BB-49CA-B215-3704BECDC33C}"/>
+                <a16:creationId xmlns:a16="http://schemas.microsoft.com/office/drawing/2014/main" id="{820EF4B0-F143-4E5F-B4B6-34497EB8BEED}"/>
               </a:ext>
             </a:extLst>
           </p:cNvPr>
@@ -10037,47 +10493,55 @@
             <p:ph type="title"/>
           </p:nvPr>
         </p:nvSpPr>
-        <p:spPr/>
+        <p:spPr>
+          <a:xfrm>
+            <a:off x="3002132" y="386179"/>
+            <a:ext cx="8610600" cy="1293028"/>
+          </a:xfrm>
+        </p:spPr>
         <p:txBody>
           <a:bodyPr/>
           <a:lstStyle/>
           <a:p>
             <a:r>
               <a:rPr lang="pl-PL" dirty="0"/>
-              <a:t>Wnioski </a:t>
-            </a:r>
-          </a:p>
-        </p:txBody>
-      </p:sp>
-      <p:sp>
-        <p:nvSpPr>
-          <p:cNvPr id="3" name="Symbol zastępczy zawartości 2">
+              <a:t>Porównanie wydajności</a:t>
+            </a:r>
+          </a:p>
+        </p:txBody>
+      </p:sp>
+      <p:graphicFrame>
+        <p:nvGraphicFramePr>
+          <p:cNvPr id="5" name="Wykres 4">
             <a:extLst>
               <a:ext uri="{FF2B5EF4-FFF2-40B4-BE49-F238E27FC236}">
-                <a16:creationId xmlns:a16="http://schemas.microsoft.com/office/drawing/2014/main" id="{87C7D86C-AC87-4863-81B0-780EEEB87957}"/>
+                <a16:creationId xmlns:a16="http://schemas.microsoft.com/office/drawing/2014/main" id="{8B57DF90-CB37-4ED5-823D-0F0C2C07A5ED}"/>
               </a:ext>
             </a:extLst>
           </p:cNvPr>
-          <p:cNvSpPr>
-            <a:spLocks noGrp="1"/>
-          </p:cNvSpPr>
-          <p:nvPr>
-            <p:ph idx="1"/>
-          </p:nvPr>
-        </p:nvSpPr>
-        <p:spPr/>
-        <p:txBody>
-          <a:bodyPr/>
-          <a:lstStyle/>
-          <a:p>
-            <a:endParaRPr lang="pl-PL"/>
-          </a:p>
-        </p:txBody>
-      </p:sp>
+          <p:cNvGraphicFramePr/>
+          <p:nvPr>
+            <p:extLst>
+              <p:ext uri="{D42A27DB-BD31-4B8C-83A1-F6EECF244321}">
+                <p14:modId xmlns:p14="http://schemas.microsoft.com/office/powerpoint/2010/main" val="758548479"/>
+              </p:ext>
+            </p:extLst>
+          </p:nvPr>
+        </p:nvGraphicFramePr>
+        <p:xfrm>
+          <a:off x="514905" y="1686757"/>
+          <a:ext cx="10946167" cy="4785064"/>
+        </p:xfrm>
+        <a:graphic>
+          <a:graphicData uri="http://schemas.openxmlformats.org/drawingml/2006/chart">
+            <c:chart xmlns:c="http://schemas.openxmlformats.org/drawingml/2006/chart" xmlns:r="http://schemas.openxmlformats.org/officeDocument/2006/relationships" r:id="rId2"/>
+          </a:graphicData>
+        </a:graphic>
+      </p:graphicFrame>
     </p:spTree>
     <p:extLst>
       <p:ext uri="{BB962C8B-B14F-4D97-AF65-F5344CB8AC3E}">
-        <p14:creationId xmlns:p14="http://schemas.microsoft.com/office/powerpoint/2010/main" val="290771156"/>
+        <p14:creationId xmlns:p14="http://schemas.microsoft.com/office/powerpoint/2010/main" val="4242453434"/>
       </p:ext>
     </p:extLst>
   </p:cSld>
@@ -10090,14 +10554,6 @@
 <file path=ppt/slides/slide8.xml><?xml version="1.0" encoding="utf-8"?>
 <p:sld xmlns:a="http://schemas.openxmlformats.org/drawingml/2006/main" xmlns:r="http://schemas.openxmlformats.org/officeDocument/2006/relationships" xmlns:p="http://schemas.openxmlformats.org/presentationml/2006/main">
   <p:cSld>
-    <p:bg>
-      <p:bgPr>
-        <a:solidFill>
-          <a:schemeClr val="bg1"/>
-        </a:solidFill>
-        <a:effectLst/>
-      </p:bgPr>
-    </p:bg>
     <p:spTree>
       <p:nvGrpSpPr>
         <p:cNvPr id="1" name=""/>
@@ -10112,162 +10568,123 @@
           <a:chExt cx="0" cy="0"/>
         </a:xfrm>
       </p:grpSpPr>
-      <p:pic>
-        <p:nvPicPr>
-          <p:cNvPr id="10" name="Picture 9">
+      <p:sp>
+        <p:nvSpPr>
+          <p:cNvPr id="2" name="Tytuł 1">
             <a:extLst>
               <a:ext uri="{FF2B5EF4-FFF2-40B4-BE49-F238E27FC236}">
-                <a16:creationId xmlns:a16="http://schemas.microsoft.com/office/drawing/2014/main" id="{75577CC7-6B96-4908-84E4-0D2AC01834E3}"/>
-              </a:ext>
-              <a:ext uri="{C183D7F6-B498-43B3-948B-1728B52AA6E4}">
-                <adec:decorative xmlns:adec="http://schemas.microsoft.com/office/drawing/2017/decorative" val="1"/>
+                <a16:creationId xmlns:a16="http://schemas.microsoft.com/office/drawing/2014/main" id="{15F5E021-45BB-49CA-B215-3704BECDC33C}"/>
               </a:ext>
             </a:extLst>
           </p:cNvPr>
-          <p:cNvPicPr>
-            <a:picLocks noGrp="1" noRot="1" noChangeAspect="1" noMove="1" noResize="1" noEditPoints="1" noAdjustHandles="1" noChangeArrowheads="1" noChangeShapeType="1" noCrop="1"/>
-          </p:cNvPicPr>
-          <p:nvPr>
-            <p:extLst>
-              <p:ext uri="{386F3935-93C4-4BCD-93E2-E3B085C9AB24}">
-                <p16:designElem xmlns:p16="http://schemas.microsoft.com/office/powerpoint/2015/main" val="1"/>
-              </p:ext>
-            </p:extLst>
-          </p:nvPr>
-        </p:nvPicPr>
-        <p:blipFill>
-          <a:blip r:embed="rId2">
-            <a:extLst>
-              <a:ext uri="{28A0092B-C50C-407E-A947-70E740481C1C}">
-                <a14:useLocalDpi xmlns:a14="http://schemas.microsoft.com/office/drawing/2010/main" val="0"/>
-              </a:ext>
-            </a:extLst>
-          </a:blip>
-          <a:stretch>
-            <a:fillRect/>
-          </a:stretch>
-        </p:blipFill>
-        <p:spPr>
-          <a:xfrm>
-            <a:off x="0" y="0"/>
-            <a:ext cx="12192000" cy="1441450"/>
-          </a:xfrm>
-          <a:prstGeom prst="rect">
-            <a:avLst/>
-          </a:prstGeom>
-        </p:spPr>
-      </p:pic>
-      <p:pic>
-        <p:nvPicPr>
-          <p:cNvPr id="12" name="Picture 11">
+          <p:cNvSpPr>
+            <a:spLocks noGrp="1"/>
+          </p:cNvSpPr>
+          <p:nvPr>
+            <p:ph type="title"/>
+          </p:nvPr>
+        </p:nvSpPr>
+        <p:spPr/>
+        <p:txBody>
+          <a:bodyPr/>
+          <a:lstStyle/>
+          <a:p>
+            <a:r>
+              <a:rPr lang="pl-PL" dirty="0"/>
+              <a:t>Wnioski </a:t>
+            </a:r>
+          </a:p>
+        </p:txBody>
+      </p:sp>
+      <p:sp>
+        <p:nvSpPr>
+          <p:cNvPr id="3" name="Symbol zastępczy zawartości 2">
             <a:extLst>
               <a:ext uri="{FF2B5EF4-FFF2-40B4-BE49-F238E27FC236}">
-                <a16:creationId xmlns:a16="http://schemas.microsoft.com/office/drawing/2014/main" id="{3094519A-B61A-4BE2-9E40-30E744081BB3}"/>
-              </a:ext>
-              <a:ext uri="{C183D7F6-B498-43B3-948B-1728B52AA6E4}">
-                <adec:decorative xmlns:adec="http://schemas.microsoft.com/office/drawing/2017/decorative" val="1"/>
+                <a16:creationId xmlns:a16="http://schemas.microsoft.com/office/drawing/2014/main" id="{87C7D86C-AC87-4863-81B0-780EEEB87957}"/>
               </a:ext>
             </a:extLst>
           </p:cNvPr>
-          <p:cNvPicPr>
-            <a:picLocks noGrp="1" noRot="1" noChangeAspect="1" noMove="1" noResize="1" noEditPoints="1" noAdjustHandles="1" noChangeArrowheads="1" noChangeShapeType="1" noCrop="1"/>
-          </p:cNvPicPr>
-          <p:nvPr>
-            <p:extLst>
-              <p:ext uri="{386F3935-93C4-4BCD-93E2-E3B085C9AB24}">
-                <p16:designElem xmlns:p16="http://schemas.microsoft.com/office/powerpoint/2015/main" val="1"/>
-              </p:ext>
-            </p:extLst>
-          </p:nvPr>
-        </p:nvPicPr>
-        <p:blipFill>
-          <a:blip r:embed="rId3">
-            <a:extLst>
-              <a:ext uri="{28A0092B-C50C-407E-A947-70E740481C1C}">
-                <a14:useLocalDpi xmlns:a14="http://schemas.microsoft.com/office/drawing/2010/main" val="0"/>
-              </a:ext>
-            </a:extLst>
-          </a:blip>
-          <a:stretch>
-            <a:fillRect/>
-          </a:stretch>
-        </p:blipFill>
-        <p:spPr>
-          <a:xfrm>
-            <a:off x="0" y="4375150"/>
-            <a:ext cx="12192000" cy="2482850"/>
-          </a:xfrm>
-          <a:prstGeom prst="rect">
-            <a:avLst/>
-          </a:prstGeom>
-        </p:spPr>
-      </p:pic>
-      <p:sp useBgFill="1">
-        <p:nvSpPr>
-          <p:cNvPr id="14" name="Rectangle 13">
+          <p:cNvSpPr>
+            <a:spLocks noGrp="1"/>
+          </p:cNvSpPr>
+          <p:nvPr>
+            <p:ph idx="1"/>
+          </p:nvPr>
+        </p:nvSpPr>
+        <p:spPr/>
+        <p:txBody>
+          <a:bodyPr/>
+          <a:lstStyle/>
+          <a:p>
+            <a:endParaRPr lang="pl-PL" dirty="0"/>
+          </a:p>
+        </p:txBody>
+      </p:sp>
+    </p:spTree>
+    <p:extLst>
+      <p:ext uri="{BB962C8B-B14F-4D97-AF65-F5344CB8AC3E}">
+        <p14:creationId xmlns:p14="http://schemas.microsoft.com/office/powerpoint/2010/main" val="290771156"/>
+      </p:ext>
+    </p:extLst>
+  </p:cSld>
+  <p:clrMapOvr>
+    <a:masterClrMapping/>
+  </p:clrMapOvr>
+</p:sld>
+</file>
+
+<file path=ppt/slides/slide9.xml><?xml version="1.0" encoding="utf-8"?>
+<p:sld xmlns:a="http://schemas.openxmlformats.org/drawingml/2006/main" xmlns:r="http://schemas.openxmlformats.org/officeDocument/2006/relationships" xmlns:p="http://schemas.openxmlformats.org/presentationml/2006/main">
+  <p:cSld>
+    <p:spTree>
+      <p:nvGrpSpPr>
+        <p:cNvPr id="1" name=""/>
+        <p:cNvGrpSpPr/>
+        <p:nvPr/>
+      </p:nvGrpSpPr>
+      <p:grpSpPr>
+        <a:xfrm>
+          <a:off x="0" y="0"/>
+          <a:ext cx="0" cy="0"/>
+          <a:chOff x="0" y="0"/>
+          <a:chExt cx="0" cy="0"/>
+        </a:xfrm>
+      </p:grpSpPr>
+      <p:sp>
+        <p:nvSpPr>
+          <p:cNvPr id="2" name="Tytuł 1">
             <a:extLst>
               <a:ext uri="{FF2B5EF4-FFF2-40B4-BE49-F238E27FC236}">
-                <a16:creationId xmlns:a16="http://schemas.microsoft.com/office/drawing/2014/main" id="{A7244538-290E-40DA-A93A-14BB3E6CF173}"/>
-              </a:ext>
-              <a:ext uri="{C183D7F6-B498-43B3-948B-1728B52AA6E4}">
-                <adec:decorative xmlns:adec="http://schemas.microsoft.com/office/drawing/2017/decorative" val="1"/>
+                <a16:creationId xmlns:a16="http://schemas.microsoft.com/office/drawing/2014/main" id="{3395DC13-927C-4430-AC81-7C77D871AED0}"/>
               </a:ext>
             </a:extLst>
           </p:cNvPr>
           <p:cNvSpPr>
-            <a:spLocks noGrp="1" noRot="1" noChangeAspect="1" noMove="1" noResize="1" noEditPoints="1" noAdjustHandles="1" noChangeArrowheads="1" noChangeShapeType="1" noTextEdit="1"/>
-          </p:cNvSpPr>
-          <p:nvPr>
-            <p:extLst>
-              <p:ext uri="{386F3935-93C4-4BCD-93E2-E3B085C9AB24}">
-                <p16:designElem xmlns:p16="http://schemas.microsoft.com/office/powerpoint/2015/main" val="1"/>
-              </p:ext>
-            </p:extLst>
-          </p:nvPr>
-        </p:nvSpPr>
-        <p:spPr>
-          <a:xfrm>
-            <a:off x="0" y="-2"/>
-            <a:ext cx="12191999" cy="4543721"/>
-          </a:xfrm>
-          <a:prstGeom prst="rect">
-            <a:avLst/>
-          </a:prstGeom>
-          <a:ln>
-            <a:noFill/>
-          </a:ln>
-        </p:spPr>
-        <p:style>
-          <a:lnRef idx="2">
-            <a:schemeClr val="accent1">
-              <a:shade val="50000"/>
-            </a:schemeClr>
-          </a:lnRef>
-          <a:fillRef idx="1">
-            <a:schemeClr val="accent1"/>
-          </a:fillRef>
-          <a:effectRef idx="0">
-            <a:schemeClr val="accent1"/>
-          </a:effectRef>
-          <a:fontRef idx="minor">
-            <a:schemeClr val="lt1"/>
-          </a:fontRef>
-        </p:style>
-        <p:txBody>
-          <a:bodyPr rtlCol="0" anchor="ctr"/>
+            <a:spLocks noGrp="1"/>
+          </p:cNvSpPr>
+          <p:nvPr>
+            <p:ph type="title"/>
+          </p:nvPr>
+        </p:nvSpPr>
+        <p:spPr/>
+        <p:txBody>
+          <a:bodyPr/>
           <a:lstStyle/>
           <a:p>
-            <a:pPr algn="ctr"/>
-            <a:endParaRPr lang="en-US"/>
-          </a:p>
-        </p:txBody>
-      </p:sp>
-      <p:sp>
-        <p:nvSpPr>
-          <p:cNvPr id="2" name="Tytuł 1">
+            <a:r>
+              <a:rPr lang="pl-PL" dirty="0"/>
+              <a:t>Bibliografia </a:t>
+            </a:r>
+          </a:p>
+        </p:txBody>
+      </p:sp>
+      <p:sp>
+        <p:nvSpPr>
+          <p:cNvPr id="3" name="Symbol zastępczy zawartości 2">
             <a:extLst>
               <a:ext uri="{FF2B5EF4-FFF2-40B4-BE49-F238E27FC236}">
-                <a16:creationId xmlns:a16="http://schemas.microsoft.com/office/drawing/2014/main" id="{B5682A94-F3AF-43E5-87DA-79425C23963B}"/>
+                <a16:creationId xmlns:a16="http://schemas.microsoft.com/office/drawing/2014/main" id="{A161B7FC-F61C-4EBC-9064-EFC4EE4B7F6C}"/>
               </a:ext>
             </a:extLst>
           </p:cNvPr>
@@ -10275,190 +10692,45 @@
             <a:spLocks noGrp="1"/>
           </p:cNvSpPr>
           <p:nvPr>
-            <p:ph type="title"/>
-          </p:nvPr>
-        </p:nvSpPr>
-        <p:spPr>
-          <a:xfrm>
-            <a:off x="5615888" y="673240"/>
-            <a:ext cx="5951914" cy="3446373"/>
-          </a:xfrm>
-          <a:noFill/>
-          <a:ln w="19050">
-            <a:noFill/>
-            <a:prstDash val="dash"/>
-          </a:ln>
-        </p:spPr>
-        <p:txBody>
-          <a:bodyPr vert="horz" lIns="91440" tIns="45720" rIns="91440" bIns="45720" rtlCol="0" anchor="b">
-            <a:normAutofit/>
-          </a:bodyPr>
+            <p:ph idx="1"/>
+          </p:nvPr>
+        </p:nvSpPr>
+        <p:spPr/>
+        <p:txBody>
+          <a:bodyPr/>
           <a:lstStyle/>
           <a:p>
-            <a:pPr algn="r"/>
-            <a:r>
-              <a:rPr lang="en-US" sz="4800"/>
-              <a:t>Dziękuję za uwagę</a:t>
-            </a:r>
-          </a:p>
-        </p:txBody>
-      </p:sp>
-      <p:sp useBgFill="1">
-        <p:nvSpPr>
-          <p:cNvPr id="16" name="Rectangle 15">
-            <a:extLst>
-              <a:ext uri="{FF2B5EF4-FFF2-40B4-BE49-F238E27FC236}">
-                <a16:creationId xmlns:a16="http://schemas.microsoft.com/office/drawing/2014/main" id="{AB1DF3B3-9DBC-445D-AE4E-A62E5A9B85D5}"/>
-              </a:ext>
-              <a:ext uri="{C183D7F6-B498-43B3-948B-1728B52AA6E4}">
-                <adec:decorative xmlns:adec="http://schemas.microsoft.com/office/drawing/2017/decorative" val="1"/>
-              </a:ext>
-            </a:extLst>
-          </p:cNvPr>
-          <p:cNvSpPr>
-            <a:spLocks noGrp="1" noRot="1" noChangeAspect="1" noMove="1" noResize="1" noEditPoints="1" noAdjustHandles="1" noChangeArrowheads="1" noChangeShapeType="1" noTextEdit="1"/>
-          </p:cNvSpPr>
-          <p:nvPr>
-            <p:extLst>
-              <p:ext uri="{386F3935-93C4-4BCD-93E2-E3B085C9AB24}">
-                <p16:designElem xmlns:p16="http://schemas.microsoft.com/office/powerpoint/2015/main" val="1"/>
-              </p:ext>
-            </p:extLst>
-          </p:nvPr>
-        </p:nvSpPr>
-        <p:spPr>
-          <a:xfrm>
-            <a:off x="-1" y="0"/>
-            <a:ext cx="4966386" cy="6858000"/>
-          </a:xfrm>
-          <a:prstGeom prst="rect">
-            <a:avLst/>
-          </a:prstGeom>
-          <a:ln>
-            <a:noFill/>
-          </a:ln>
-        </p:spPr>
-        <p:style>
-          <a:lnRef idx="2">
-            <a:schemeClr val="accent1">
-              <a:shade val="50000"/>
-            </a:schemeClr>
-          </a:lnRef>
-          <a:fillRef idx="1">
-            <a:schemeClr val="accent1"/>
-          </a:fillRef>
-          <a:effectRef idx="0">
-            <a:schemeClr val="accent1"/>
-          </a:effectRef>
-          <a:fontRef idx="minor">
-            <a:schemeClr val="lt1"/>
-          </a:fontRef>
-        </p:style>
-        <p:txBody>
-          <a:bodyPr rtlCol="0" anchor="ctr"/>
-          <a:lstStyle/>
-          <a:p>
-            <a:pPr algn="ctr"/>
-            <a:endParaRPr lang="en-US"/>
-          </a:p>
-        </p:txBody>
-      </p:sp>
-      <p:pic>
-        <p:nvPicPr>
-          <p:cNvPr id="5" name="Obraz 4">
-            <a:extLst>
-              <a:ext uri="{FF2B5EF4-FFF2-40B4-BE49-F238E27FC236}">
-                <a16:creationId xmlns:a16="http://schemas.microsoft.com/office/drawing/2014/main" id="{5833AE4D-2043-4730-A29F-2C1452879143}"/>
-              </a:ext>
-            </a:extLst>
-          </p:cNvPr>
-          <p:cNvPicPr>
-            <a:picLocks noChangeAspect="1"/>
-          </p:cNvPicPr>
-          <p:nvPr/>
-        </p:nvPicPr>
-        <p:blipFill rotWithShape="1">
-          <a:blip r:embed="rId4"/>
-          <a:srcRect l="5406" r="7585"/>
-          <a:stretch/>
-        </p:blipFill>
-        <p:spPr>
-          <a:xfrm>
-            <a:off x="-4" y="10"/>
-            <a:ext cx="4654291" cy="6857990"/>
-          </a:xfrm>
-          <a:prstGeom prst="rect">
-            <a:avLst/>
-          </a:prstGeom>
-        </p:spPr>
-      </p:pic>
-      <p:sp>
-        <p:nvSpPr>
-          <p:cNvPr id="18" name="Rectangle 17">
-            <a:extLst>
-              <a:ext uri="{FF2B5EF4-FFF2-40B4-BE49-F238E27FC236}">
-                <a16:creationId xmlns:a16="http://schemas.microsoft.com/office/drawing/2014/main" id="{F51F80E8-0CAC-410E-B59A-29FDDC357ED4}"/>
-              </a:ext>
-              <a:ext uri="{C183D7F6-B498-43B3-948B-1728B52AA6E4}">
-                <adec:decorative xmlns:adec="http://schemas.microsoft.com/office/drawing/2017/decorative" val="1"/>
-              </a:ext>
-            </a:extLst>
-          </p:cNvPr>
-          <p:cNvSpPr>
-            <a:spLocks noGrp="1" noRot="1" noChangeAspect="1" noMove="1" noResize="1" noEditPoints="1" noAdjustHandles="1" noChangeArrowheads="1" noChangeShapeType="1" noTextEdit="1"/>
-          </p:cNvSpPr>
-          <p:nvPr>
-            <p:extLst>
-              <p:ext uri="{386F3935-93C4-4BCD-93E2-E3B085C9AB24}">
-                <p16:designElem xmlns:p16="http://schemas.microsoft.com/office/powerpoint/2015/main" val="1"/>
-              </p:ext>
-            </p:extLst>
-          </p:nvPr>
-        </p:nvSpPr>
-        <p:spPr>
-          <a:xfrm>
-            <a:off x="7946782" y="-1"/>
-            <a:ext cx="4245218" cy="536715"/>
-          </a:xfrm>
-          <a:prstGeom prst="rect">
-            <a:avLst/>
-          </a:prstGeom>
-          <a:solidFill>
-            <a:schemeClr val="bg1"/>
-          </a:solidFill>
-          <a:ln>
-            <a:noFill/>
-          </a:ln>
-        </p:spPr>
-        <p:style>
-          <a:lnRef idx="2">
-            <a:schemeClr val="accent1">
-              <a:shade val="50000"/>
-            </a:schemeClr>
-          </a:lnRef>
-          <a:fillRef idx="1">
-            <a:schemeClr val="accent1"/>
-          </a:fillRef>
-          <a:effectRef idx="0">
-            <a:schemeClr val="accent1"/>
-          </a:effectRef>
-          <a:fontRef idx="minor">
-            <a:schemeClr val="lt1"/>
-          </a:fontRef>
-        </p:style>
-        <p:txBody>
-          <a:bodyPr rtlCol="0" anchor="ctr"/>
-          <a:lstStyle/>
-          <a:p>
-            <a:pPr algn="ctr"/>
-            <a:endParaRPr lang="en-US"/>
+            <a:r>
+              <a:rPr lang="pl-PL" dirty="0"/>
+              <a:t>„Praktyczny kurs assemblera”, E. Wróbel, Helion, Gliwice 2004</a:t>
+            </a:r>
+          </a:p>
+          <a:p>
+            <a:r>
+              <a:rPr lang="pl-PL" dirty="0"/>
+              <a:t>„Asembler. Sztuka programowania”, </a:t>
+            </a:r>
+            <a:r>
+              <a:rPr lang="pl-PL" dirty="0" err="1"/>
+              <a:t>Randall</a:t>
+            </a:r>
+            <a:r>
+              <a:rPr lang="pl-PL" dirty="0"/>
+              <a:t> Hyde, Helion, Gliwice 2004</a:t>
+            </a:r>
+          </a:p>
+          <a:p>
+            <a:r>
+              <a:rPr lang="pl-PL" dirty="0"/>
+              <a:t>https://docs.microsoft.com/en-us/windows-hardware/drivers/debugger/x64-architecture?redirectedfrom=MSDN</a:t>
+            </a:r>
           </a:p>
         </p:txBody>
       </p:sp>
     </p:spTree>
     <p:extLst>
       <p:ext uri="{BB962C8B-B14F-4D97-AF65-F5344CB8AC3E}">
-        <p14:creationId xmlns:p14="http://schemas.microsoft.com/office/powerpoint/2010/main" val="485248565"/>
+        <p14:creationId xmlns:p14="http://schemas.microsoft.com/office/powerpoint/2010/main" val="3751433442"/>
       </p:ext>
     </p:extLst>
   </p:cSld>

</xml_diff>